<commit_message>
Only final prrof reading and time + money estimates remain
</commit_message>
<xml_diff>
--- a/Experiments/draw_options.pptx
+++ b/Experiments/draw_options.pptx
@@ -204,7 +204,7 @@
           <a:p>
             <a:fld id="{82561481-6439-C04E-A1CE-982AC2175A07}" type="datetimeFigureOut">
               <a:rPr lang="en-US" smtClean="0"/>
-              <a:t>8/28/19</a:t>
+              <a:t>9/6/19</a:t>
             </a:fld>
             <a:endParaRPr lang="en-US"/>
           </a:p>
@@ -1315,7 +1315,7 @@
           <a:p>
             <a:fld id="{E02736CB-4232-A146-B165-19378F549313}" type="datetimeFigureOut">
               <a:rPr lang="en-US" smtClean="0"/>
-              <a:t>8/28/19</a:t>
+              <a:t>9/6/19</a:t>
             </a:fld>
             <a:endParaRPr lang="en-US"/>
           </a:p>
@@ -1480,7 +1480,7 @@
           <a:p>
             <a:fld id="{E02736CB-4232-A146-B165-19378F549313}" type="datetimeFigureOut">
               <a:rPr lang="en-US" smtClean="0"/>
-              <a:t>8/28/19</a:t>
+              <a:t>9/6/19</a:t>
             </a:fld>
             <a:endParaRPr lang="en-US"/>
           </a:p>
@@ -1655,7 +1655,7 @@
           <a:p>
             <a:fld id="{E02736CB-4232-A146-B165-19378F549313}" type="datetimeFigureOut">
               <a:rPr lang="en-US" smtClean="0"/>
-              <a:t>8/28/19</a:t>
+              <a:t>9/6/19</a:t>
             </a:fld>
             <a:endParaRPr lang="en-US"/>
           </a:p>
@@ -1820,7 +1820,7 @@
           <a:p>
             <a:fld id="{E02736CB-4232-A146-B165-19378F549313}" type="datetimeFigureOut">
               <a:rPr lang="en-US" smtClean="0"/>
-              <a:t>8/28/19</a:t>
+              <a:t>9/6/19</a:t>
             </a:fld>
             <a:endParaRPr lang="en-US"/>
           </a:p>
@@ -2059,7 +2059,7 @@
           <a:p>
             <a:fld id="{E02736CB-4232-A146-B165-19378F549313}" type="datetimeFigureOut">
               <a:rPr lang="en-US" smtClean="0"/>
-              <a:t>8/28/19</a:t>
+              <a:t>9/6/19</a:t>
             </a:fld>
             <a:endParaRPr lang="en-US"/>
           </a:p>
@@ -2286,7 +2286,7 @@
           <a:p>
             <a:fld id="{E02736CB-4232-A146-B165-19378F549313}" type="datetimeFigureOut">
               <a:rPr lang="en-US" smtClean="0"/>
-              <a:t>8/28/19</a:t>
+              <a:t>9/6/19</a:t>
             </a:fld>
             <a:endParaRPr lang="en-US"/>
           </a:p>
@@ -2648,7 +2648,7 @@
           <a:p>
             <a:fld id="{E02736CB-4232-A146-B165-19378F549313}" type="datetimeFigureOut">
               <a:rPr lang="en-US" smtClean="0"/>
-              <a:t>8/28/19</a:t>
+              <a:t>9/6/19</a:t>
             </a:fld>
             <a:endParaRPr lang="en-US"/>
           </a:p>
@@ -2761,7 +2761,7 @@
           <a:p>
             <a:fld id="{E02736CB-4232-A146-B165-19378F549313}" type="datetimeFigureOut">
               <a:rPr lang="en-US" smtClean="0"/>
-              <a:t>8/28/19</a:t>
+              <a:t>9/6/19</a:t>
             </a:fld>
             <a:endParaRPr lang="en-US"/>
           </a:p>
@@ -2851,7 +2851,7 @@
           <a:p>
             <a:fld id="{E02736CB-4232-A146-B165-19378F549313}" type="datetimeFigureOut">
               <a:rPr lang="en-US" smtClean="0"/>
-              <a:t>8/28/19</a:t>
+              <a:t>9/6/19</a:t>
             </a:fld>
             <a:endParaRPr lang="en-US"/>
           </a:p>
@@ -3123,7 +3123,7 @@
           <a:p>
             <a:fld id="{E02736CB-4232-A146-B165-19378F549313}" type="datetimeFigureOut">
               <a:rPr lang="en-US" smtClean="0"/>
-              <a:t>8/28/19</a:t>
+              <a:t>9/6/19</a:t>
             </a:fld>
             <a:endParaRPr lang="en-US"/>
           </a:p>
@@ -3375,7 +3375,7 @@
           <a:p>
             <a:fld id="{E02736CB-4232-A146-B165-19378F549313}" type="datetimeFigureOut">
               <a:rPr lang="en-US" smtClean="0"/>
-              <a:t>8/28/19</a:t>
+              <a:t>9/6/19</a:t>
             </a:fld>
             <a:endParaRPr lang="en-US"/>
           </a:p>
@@ -3583,7 +3583,7 @@
           <a:p>
             <a:fld id="{E02736CB-4232-A146-B165-19378F549313}" type="datetimeFigureOut">
               <a:rPr lang="en-US" smtClean="0"/>
-              <a:t>8/28/19</a:t>
+              <a:t>9/6/19</a:t>
             </a:fld>
             <a:endParaRPr lang="en-US"/>
           </a:p>
@@ -4177,6 +4177,52 @@
           </a:p>
         </p:txBody>
       </p:sp>
+      <p:sp>
+        <p:nvSpPr>
+          <p:cNvPr id="2" name="Rectangle 1"/>
+          <p:cNvSpPr/>
+          <p:nvPr/>
+        </p:nvSpPr>
+        <p:spPr>
+          <a:xfrm>
+            <a:off x="64294" y="81776"/>
+            <a:ext cx="6265069" cy="6675863"/>
+          </a:xfrm>
+          <a:prstGeom prst="rect">
+            <a:avLst/>
+          </a:prstGeom>
+          <a:noFill/>
+          <a:ln w="28575">
+            <a:solidFill>
+              <a:schemeClr val="tx1"/>
+            </a:solidFill>
+          </a:ln>
+        </p:spPr>
+        <p:style>
+          <a:lnRef idx="2">
+            <a:schemeClr val="accent1">
+              <a:shade val="50000"/>
+            </a:schemeClr>
+          </a:lnRef>
+          <a:fillRef idx="1">
+            <a:schemeClr val="accent1"/>
+          </a:fillRef>
+          <a:effectRef idx="0">
+            <a:schemeClr val="accent1"/>
+          </a:effectRef>
+          <a:fontRef idx="minor">
+            <a:schemeClr val="lt1"/>
+          </a:fontRef>
+        </p:style>
+        <p:txBody>
+          <a:bodyPr rtlCol="0" anchor="ctr"/>
+          <a:lstStyle/>
+          <a:p>
+            <a:pPr algn="ctr"/>
+            <a:endParaRPr lang="en-US"/>
+          </a:p>
+        </p:txBody>
+      </p:sp>
     </p:spTree>
     <p:extLst>
       <p:ext uri="{BB962C8B-B14F-4D97-AF65-F5344CB8AC3E}">
@@ -4401,6 +4447,52 @@
           </a:p>
         </p:txBody>
       </p:sp>
+      <p:sp>
+        <p:nvSpPr>
+          <p:cNvPr id="7" name="Rectangle 6"/>
+          <p:cNvSpPr/>
+          <p:nvPr/>
+        </p:nvSpPr>
+        <p:spPr>
+          <a:xfrm>
+            <a:off x="64294" y="96064"/>
+            <a:ext cx="6265069" cy="6675863"/>
+          </a:xfrm>
+          <a:prstGeom prst="rect">
+            <a:avLst/>
+          </a:prstGeom>
+          <a:noFill/>
+          <a:ln w="28575">
+            <a:solidFill>
+              <a:schemeClr val="tx1"/>
+            </a:solidFill>
+          </a:ln>
+        </p:spPr>
+        <p:style>
+          <a:lnRef idx="2">
+            <a:schemeClr val="accent1">
+              <a:shade val="50000"/>
+            </a:schemeClr>
+          </a:lnRef>
+          <a:fillRef idx="1">
+            <a:schemeClr val="accent1"/>
+          </a:fillRef>
+          <a:effectRef idx="0">
+            <a:schemeClr val="accent1"/>
+          </a:effectRef>
+          <a:fontRef idx="minor">
+            <a:schemeClr val="lt1"/>
+          </a:fontRef>
+        </p:style>
+        <p:txBody>
+          <a:bodyPr rtlCol="0" anchor="ctr"/>
+          <a:lstStyle/>
+          <a:p>
+            <a:pPr algn="ctr"/>
+            <a:endParaRPr lang="en-US"/>
+          </a:p>
+        </p:txBody>
+      </p:sp>
     </p:spTree>
     <p:extLst>
       <p:ext uri="{BB962C8B-B14F-4D97-AF65-F5344CB8AC3E}">
@@ -4625,6 +4717,52 @@
           </a:p>
         </p:txBody>
       </p:sp>
+      <p:sp>
+        <p:nvSpPr>
+          <p:cNvPr id="7" name="Rectangle 6"/>
+          <p:cNvSpPr/>
+          <p:nvPr/>
+        </p:nvSpPr>
+        <p:spPr>
+          <a:xfrm>
+            <a:off x="64294" y="81776"/>
+            <a:ext cx="6265069" cy="6675863"/>
+          </a:xfrm>
+          <a:prstGeom prst="rect">
+            <a:avLst/>
+          </a:prstGeom>
+          <a:noFill/>
+          <a:ln w="28575">
+            <a:solidFill>
+              <a:schemeClr val="tx1"/>
+            </a:solidFill>
+          </a:ln>
+        </p:spPr>
+        <p:style>
+          <a:lnRef idx="2">
+            <a:schemeClr val="accent1">
+              <a:shade val="50000"/>
+            </a:schemeClr>
+          </a:lnRef>
+          <a:fillRef idx="1">
+            <a:schemeClr val="accent1"/>
+          </a:fillRef>
+          <a:effectRef idx="0">
+            <a:schemeClr val="accent1"/>
+          </a:effectRef>
+          <a:fontRef idx="minor">
+            <a:schemeClr val="lt1"/>
+          </a:fontRef>
+        </p:style>
+        <p:txBody>
+          <a:bodyPr rtlCol="0" anchor="ctr"/>
+          <a:lstStyle/>
+          <a:p>
+            <a:pPr algn="ctr"/>
+            <a:endParaRPr lang="en-US"/>
+          </a:p>
+        </p:txBody>
+      </p:sp>
     </p:spTree>
     <p:extLst>
       <p:ext uri="{BB962C8B-B14F-4D97-AF65-F5344CB8AC3E}">
@@ -4849,6 +4987,52 @@
           </a:p>
         </p:txBody>
       </p:sp>
+      <p:sp>
+        <p:nvSpPr>
+          <p:cNvPr id="7" name="Rectangle 6"/>
+          <p:cNvSpPr/>
+          <p:nvPr/>
+        </p:nvSpPr>
+        <p:spPr>
+          <a:xfrm>
+            <a:off x="64294" y="81776"/>
+            <a:ext cx="6265069" cy="6675863"/>
+          </a:xfrm>
+          <a:prstGeom prst="rect">
+            <a:avLst/>
+          </a:prstGeom>
+          <a:noFill/>
+          <a:ln w="28575">
+            <a:solidFill>
+              <a:schemeClr val="tx1"/>
+            </a:solidFill>
+          </a:ln>
+        </p:spPr>
+        <p:style>
+          <a:lnRef idx="2">
+            <a:schemeClr val="accent1">
+              <a:shade val="50000"/>
+            </a:schemeClr>
+          </a:lnRef>
+          <a:fillRef idx="1">
+            <a:schemeClr val="accent1"/>
+          </a:fillRef>
+          <a:effectRef idx="0">
+            <a:schemeClr val="accent1"/>
+          </a:effectRef>
+          <a:fontRef idx="minor">
+            <a:schemeClr val="lt1"/>
+          </a:fontRef>
+        </p:style>
+        <p:txBody>
+          <a:bodyPr rtlCol="0" anchor="ctr"/>
+          <a:lstStyle/>
+          <a:p>
+            <a:pPr algn="ctr"/>
+            <a:endParaRPr lang="en-US"/>
+          </a:p>
+        </p:txBody>
+      </p:sp>
     </p:spTree>
     <p:extLst>
       <p:ext uri="{BB962C8B-B14F-4D97-AF65-F5344CB8AC3E}">
@@ -5078,6 +5262,52 @@
           </a:p>
         </p:txBody>
       </p:sp>
+      <p:sp>
+        <p:nvSpPr>
+          <p:cNvPr id="7" name="Rectangle 6"/>
+          <p:cNvSpPr/>
+          <p:nvPr/>
+        </p:nvSpPr>
+        <p:spPr>
+          <a:xfrm>
+            <a:off x="64294" y="81776"/>
+            <a:ext cx="6265069" cy="6675863"/>
+          </a:xfrm>
+          <a:prstGeom prst="rect">
+            <a:avLst/>
+          </a:prstGeom>
+          <a:noFill/>
+          <a:ln w="28575">
+            <a:solidFill>
+              <a:schemeClr val="tx1"/>
+            </a:solidFill>
+          </a:ln>
+        </p:spPr>
+        <p:style>
+          <a:lnRef idx="2">
+            <a:schemeClr val="accent1">
+              <a:shade val="50000"/>
+            </a:schemeClr>
+          </a:lnRef>
+          <a:fillRef idx="1">
+            <a:schemeClr val="accent1"/>
+          </a:fillRef>
+          <a:effectRef idx="0">
+            <a:schemeClr val="accent1"/>
+          </a:effectRef>
+          <a:fontRef idx="minor">
+            <a:schemeClr val="lt1"/>
+          </a:fontRef>
+        </p:style>
+        <p:txBody>
+          <a:bodyPr rtlCol="0" anchor="ctr"/>
+          <a:lstStyle/>
+          <a:p>
+            <a:pPr algn="ctr"/>
+            <a:endParaRPr lang="en-US"/>
+          </a:p>
+        </p:txBody>
+      </p:sp>
     </p:spTree>
     <p:extLst>
       <p:ext uri="{BB962C8B-B14F-4D97-AF65-F5344CB8AC3E}">
@@ -5307,6 +5537,52 @@
           </a:p>
         </p:txBody>
       </p:sp>
+      <p:sp>
+        <p:nvSpPr>
+          <p:cNvPr id="7" name="Rectangle 6"/>
+          <p:cNvSpPr/>
+          <p:nvPr/>
+        </p:nvSpPr>
+        <p:spPr>
+          <a:xfrm>
+            <a:off x="64294" y="81776"/>
+            <a:ext cx="6265069" cy="6675863"/>
+          </a:xfrm>
+          <a:prstGeom prst="rect">
+            <a:avLst/>
+          </a:prstGeom>
+          <a:noFill/>
+          <a:ln w="28575">
+            <a:solidFill>
+              <a:schemeClr val="tx1"/>
+            </a:solidFill>
+          </a:ln>
+        </p:spPr>
+        <p:style>
+          <a:lnRef idx="2">
+            <a:schemeClr val="accent1">
+              <a:shade val="50000"/>
+            </a:schemeClr>
+          </a:lnRef>
+          <a:fillRef idx="1">
+            <a:schemeClr val="accent1"/>
+          </a:fillRef>
+          <a:effectRef idx="0">
+            <a:schemeClr val="accent1"/>
+          </a:effectRef>
+          <a:fontRef idx="minor">
+            <a:schemeClr val="lt1"/>
+          </a:fontRef>
+        </p:style>
+        <p:txBody>
+          <a:bodyPr rtlCol="0" anchor="ctr"/>
+          <a:lstStyle/>
+          <a:p>
+            <a:pPr algn="ctr"/>
+            <a:endParaRPr lang="en-US"/>
+          </a:p>
+        </p:txBody>
+      </p:sp>
     </p:spTree>
     <p:extLst>
       <p:ext uri="{BB962C8B-B14F-4D97-AF65-F5344CB8AC3E}">
@@ -5536,6 +5812,52 @@
           </a:p>
         </p:txBody>
       </p:sp>
+      <p:sp>
+        <p:nvSpPr>
+          <p:cNvPr id="7" name="Rectangle 6"/>
+          <p:cNvSpPr/>
+          <p:nvPr/>
+        </p:nvSpPr>
+        <p:spPr>
+          <a:xfrm>
+            <a:off x="64294" y="81776"/>
+            <a:ext cx="6265069" cy="6675863"/>
+          </a:xfrm>
+          <a:prstGeom prst="rect">
+            <a:avLst/>
+          </a:prstGeom>
+          <a:noFill/>
+          <a:ln w="28575">
+            <a:solidFill>
+              <a:schemeClr val="tx1"/>
+            </a:solidFill>
+          </a:ln>
+        </p:spPr>
+        <p:style>
+          <a:lnRef idx="2">
+            <a:schemeClr val="accent1">
+              <a:shade val="50000"/>
+            </a:schemeClr>
+          </a:lnRef>
+          <a:fillRef idx="1">
+            <a:schemeClr val="accent1"/>
+          </a:fillRef>
+          <a:effectRef idx="0">
+            <a:schemeClr val="accent1"/>
+          </a:effectRef>
+          <a:fontRef idx="minor">
+            <a:schemeClr val="lt1"/>
+          </a:fontRef>
+        </p:style>
+        <p:txBody>
+          <a:bodyPr rtlCol="0" anchor="ctr"/>
+          <a:lstStyle/>
+          <a:p>
+            <a:pPr algn="ctr"/>
+            <a:endParaRPr lang="en-US"/>
+          </a:p>
+        </p:txBody>
+      </p:sp>
     </p:spTree>
     <p:extLst>
       <p:ext uri="{BB962C8B-B14F-4D97-AF65-F5344CB8AC3E}">
@@ -5767,6 +6089,52 @@
                 <a:srgbClr val="C00000"/>
               </a:solidFill>
             </a:endParaRPr>
+          </a:p>
+        </p:txBody>
+      </p:sp>
+      <p:sp>
+        <p:nvSpPr>
+          <p:cNvPr id="7" name="Rectangle 6"/>
+          <p:cNvSpPr/>
+          <p:nvPr/>
+        </p:nvSpPr>
+        <p:spPr>
+          <a:xfrm>
+            <a:off x="64294" y="81776"/>
+            <a:ext cx="6265069" cy="6675863"/>
+          </a:xfrm>
+          <a:prstGeom prst="rect">
+            <a:avLst/>
+          </a:prstGeom>
+          <a:noFill/>
+          <a:ln w="28575">
+            <a:solidFill>
+              <a:schemeClr val="tx1"/>
+            </a:solidFill>
+          </a:ln>
+        </p:spPr>
+        <p:style>
+          <a:lnRef idx="2">
+            <a:schemeClr val="accent1">
+              <a:shade val="50000"/>
+            </a:schemeClr>
+          </a:lnRef>
+          <a:fillRef idx="1">
+            <a:schemeClr val="accent1"/>
+          </a:fillRef>
+          <a:effectRef idx="0">
+            <a:schemeClr val="accent1"/>
+          </a:effectRef>
+          <a:fontRef idx="minor">
+            <a:schemeClr val="lt1"/>
+          </a:fontRef>
+        </p:style>
+        <p:txBody>
+          <a:bodyPr rtlCol="0" anchor="ctr"/>
+          <a:lstStyle/>
+          <a:p>
+            <a:pPr algn="ctr"/>
+            <a:endParaRPr lang="en-US"/>
           </a:p>
         </p:txBody>
       </p:sp>

</xml_diff>

<commit_message>
Adding new readout variables to analysis
</commit_message>
<xml_diff>
--- a/Experiments/draw_options.pptx
+++ b/Experiments/draw_options.pptx
@@ -9,12 +9,12 @@
   </p:notesMasterIdLst>
   <p:sldIdLst>
     <p:sldId id="257" r:id="rId2"/>
-    <p:sldId id="258" r:id="rId3"/>
+    <p:sldId id="260" r:id="rId3"/>
     <p:sldId id="259" r:id="rId4"/>
-    <p:sldId id="260" r:id="rId5"/>
-    <p:sldId id="261" r:id="rId6"/>
+    <p:sldId id="263" r:id="rId5"/>
+    <p:sldId id="258" r:id="rId6"/>
     <p:sldId id="262" r:id="rId7"/>
-    <p:sldId id="263" r:id="rId8"/>
+    <p:sldId id="261" r:id="rId8"/>
     <p:sldId id="264" r:id="rId9"/>
   </p:sldIdLst>
   <p:sldSz cx="6400800" cy="6858000"/>
@@ -204,7 +204,7 @@
           <a:p>
             <a:fld id="{82561481-6439-C04E-A1CE-982AC2175A07}" type="datetimeFigureOut">
               <a:rPr lang="en-US" smtClean="0"/>
-              <a:t>9/6/19</a:t>
+              <a:t>1/21/20</a:t>
             </a:fld>
             <a:endParaRPr lang="en-US"/>
           </a:p>
@@ -640,7 +640,7 @@
     </p:spTree>
     <p:extLst>
       <p:ext uri="{BB962C8B-B14F-4D97-AF65-F5344CB8AC3E}">
-        <p14:creationId xmlns:p14="http://schemas.microsoft.com/office/powerpoint/2010/main" val="1896441088"/>
+        <p14:creationId xmlns:p14="http://schemas.microsoft.com/office/powerpoint/2010/main" val="2066622394"/>
       </p:ext>
     </p:extLst>
   </p:cSld>
@@ -818,7 +818,7 @@
     </p:spTree>
     <p:extLst>
       <p:ext uri="{BB962C8B-B14F-4D97-AF65-F5344CB8AC3E}">
-        <p14:creationId xmlns:p14="http://schemas.microsoft.com/office/powerpoint/2010/main" val="2066622394"/>
+        <p14:creationId xmlns:p14="http://schemas.microsoft.com/office/powerpoint/2010/main" val="1512875669"/>
       </p:ext>
     </p:extLst>
   </p:cSld>
@@ -907,7 +907,7 @@
     </p:spTree>
     <p:extLst>
       <p:ext uri="{BB962C8B-B14F-4D97-AF65-F5344CB8AC3E}">
-        <p14:creationId xmlns:p14="http://schemas.microsoft.com/office/powerpoint/2010/main" val="1043820653"/>
+        <p14:creationId xmlns:p14="http://schemas.microsoft.com/office/powerpoint/2010/main" val="1896441088"/>
       </p:ext>
     </p:extLst>
   </p:cSld>
@@ -1085,7 +1085,7 @@
     </p:spTree>
     <p:extLst>
       <p:ext uri="{BB962C8B-B14F-4D97-AF65-F5344CB8AC3E}">
-        <p14:creationId xmlns:p14="http://schemas.microsoft.com/office/powerpoint/2010/main" val="1512875669"/>
+        <p14:creationId xmlns:p14="http://schemas.microsoft.com/office/powerpoint/2010/main" val="1043820653"/>
       </p:ext>
     </p:extLst>
   </p:cSld>
@@ -1315,7 +1315,7 @@
           <a:p>
             <a:fld id="{E02736CB-4232-A146-B165-19378F549313}" type="datetimeFigureOut">
               <a:rPr lang="en-US" smtClean="0"/>
-              <a:t>9/6/19</a:t>
+              <a:t>1/21/20</a:t>
             </a:fld>
             <a:endParaRPr lang="en-US"/>
           </a:p>
@@ -1480,7 +1480,7 @@
           <a:p>
             <a:fld id="{E02736CB-4232-A146-B165-19378F549313}" type="datetimeFigureOut">
               <a:rPr lang="en-US" smtClean="0"/>
-              <a:t>9/6/19</a:t>
+              <a:t>1/21/20</a:t>
             </a:fld>
             <a:endParaRPr lang="en-US"/>
           </a:p>
@@ -1655,7 +1655,7 @@
           <a:p>
             <a:fld id="{E02736CB-4232-A146-B165-19378F549313}" type="datetimeFigureOut">
               <a:rPr lang="en-US" smtClean="0"/>
-              <a:t>9/6/19</a:t>
+              <a:t>1/21/20</a:t>
             </a:fld>
             <a:endParaRPr lang="en-US"/>
           </a:p>
@@ -1820,7 +1820,7 @@
           <a:p>
             <a:fld id="{E02736CB-4232-A146-B165-19378F549313}" type="datetimeFigureOut">
               <a:rPr lang="en-US" smtClean="0"/>
-              <a:t>9/6/19</a:t>
+              <a:t>1/21/20</a:t>
             </a:fld>
             <a:endParaRPr lang="en-US"/>
           </a:p>
@@ -2059,7 +2059,7 @@
           <a:p>
             <a:fld id="{E02736CB-4232-A146-B165-19378F549313}" type="datetimeFigureOut">
               <a:rPr lang="en-US" smtClean="0"/>
-              <a:t>9/6/19</a:t>
+              <a:t>1/21/20</a:t>
             </a:fld>
             <a:endParaRPr lang="en-US"/>
           </a:p>
@@ -2286,7 +2286,7 @@
           <a:p>
             <a:fld id="{E02736CB-4232-A146-B165-19378F549313}" type="datetimeFigureOut">
               <a:rPr lang="en-US" smtClean="0"/>
-              <a:t>9/6/19</a:t>
+              <a:t>1/21/20</a:t>
             </a:fld>
             <a:endParaRPr lang="en-US"/>
           </a:p>
@@ -2648,7 +2648,7 @@
           <a:p>
             <a:fld id="{E02736CB-4232-A146-B165-19378F549313}" type="datetimeFigureOut">
               <a:rPr lang="en-US" smtClean="0"/>
-              <a:t>9/6/19</a:t>
+              <a:t>1/21/20</a:t>
             </a:fld>
             <a:endParaRPr lang="en-US"/>
           </a:p>
@@ -2761,7 +2761,7 @@
           <a:p>
             <a:fld id="{E02736CB-4232-A146-B165-19378F549313}" type="datetimeFigureOut">
               <a:rPr lang="en-US" smtClean="0"/>
-              <a:t>9/6/19</a:t>
+              <a:t>1/21/20</a:t>
             </a:fld>
             <a:endParaRPr lang="en-US"/>
           </a:p>
@@ -2851,7 +2851,7 @@
           <a:p>
             <a:fld id="{E02736CB-4232-A146-B165-19378F549313}" type="datetimeFigureOut">
               <a:rPr lang="en-US" smtClean="0"/>
-              <a:t>9/6/19</a:t>
+              <a:t>1/21/20</a:t>
             </a:fld>
             <a:endParaRPr lang="en-US"/>
           </a:p>
@@ -3123,7 +3123,7 @@
           <a:p>
             <a:fld id="{E02736CB-4232-A146-B165-19378F549313}" type="datetimeFigureOut">
               <a:rPr lang="en-US" smtClean="0"/>
-              <a:t>9/6/19</a:t>
+              <a:t>1/21/20</a:t>
             </a:fld>
             <a:endParaRPr lang="en-US"/>
           </a:p>
@@ -3375,7 +3375,7 @@
           <a:p>
             <a:fld id="{E02736CB-4232-A146-B165-19378F549313}" type="datetimeFigureOut">
               <a:rPr lang="en-US" smtClean="0"/>
-              <a:t>9/6/19</a:t>
+              <a:t>1/21/20</a:t>
             </a:fld>
             <a:endParaRPr lang="en-US"/>
           </a:p>
@@ -3583,7 +3583,7 @@
           <a:p>
             <a:fld id="{E02736CB-4232-A146-B165-19378F549313}" type="datetimeFigureOut">
               <a:rPr lang="en-US" smtClean="0"/>
-              <a:t>9/6/19</a:t>
+              <a:t>1/21/20</a:t>
             </a:fld>
             <a:endParaRPr lang="en-US"/>
           </a:p>
@@ -4267,7 +4267,12 @@
           <a:prstGeom prst="ellipse">
             <a:avLst/>
           </a:prstGeom>
-          <a:noFill/>
+          <a:solidFill>
+            <a:schemeClr val="tx1">
+              <a:lumMod val="85000"/>
+              <a:lumOff val="15000"/>
+            </a:schemeClr>
+          </a:solidFill>
           <a:ln w="38100">
             <a:solidFill>
               <a:schemeClr val="tx1"/>
@@ -4393,12 +4398,7 @@
           <a:prstGeom prst="ellipse">
             <a:avLst/>
           </a:prstGeom>
-          <a:solidFill>
-            <a:schemeClr val="tx1">
-              <a:lumMod val="85000"/>
-              <a:lumOff val="15000"/>
-            </a:schemeClr>
-          </a:solidFill>
+          <a:noFill/>
           <a:ln w="38100">
             <a:solidFill>
               <a:schemeClr val="tx1"/>
@@ -4455,7 +4455,7 @@
         </p:nvSpPr>
         <p:spPr>
           <a:xfrm>
-            <a:off x="64294" y="96064"/>
+            <a:off x="64294" y="81776"/>
             <a:ext cx="6265069" cy="6675863"/>
           </a:xfrm>
           <a:prstGeom prst="rect">
@@ -4496,7 +4496,7 @@
     </p:spTree>
     <p:extLst>
       <p:ext uri="{BB962C8B-B14F-4D97-AF65-F5344CB8AC3E}">
-        <p14:creationId xmlns:p14="http://schemas.microsoft.com/office/powerpoint/2010/main" val="1723261790"/>
+        <p14:creationId xmlns:p14="http://schemas.microsoft.com/office/powerpoint/2010/main" val="708880729"/>
       </p:ext>
     </p:extLst>
   </p:cSld>
@@ -4875,7 +4875,12 @@
           <a:prstGeom prst="ellipse">
             <a:avLst/>
           </a:prstGeom>
-          <a:noFill/>
+          <a:solidFill>
+            <a:schemeClr val="tx1">
+              <a:lumMod val="85000"/>
+              <a:lumOff val="15000"/>
+            </a:schemeClr>
+          </a:solidFill>
           <a:ln w="38100">
             <a:solidFill>
               <a:schemeClr val="tx1"/>
@@ -5036,7 +5041,7 @@
     </p:spTree>
     <p:extLst>
       <p:ext uri="{BB962C8B-B14F-4D97-AF65-F5344CB8AC3E}">
-        <p14:creationId xmlns:p14="http://schemas.microsoft.com/office/powerpoint/2010/main" val="708880729"/>
+        <p14:creationId xmlns:p14="http://schemas.microsoft.com/office/powerpoint/2010/main" val="424424708"/>
       </p:ext>
     </p:extLst>
   </p:cSld>
@@ -5140,12 +5145,7 @@
           <a:prstGeom prst="ellipse">
             <a:avLst/>
           </a:prstGeom>
-          <a:solidFill>
-            <a:schemeClr val="tx1">
-              <a:lumMod val="85000"/>
-              <a:lumOff val="15000"/>
-            </a:schemeClr>
-          </a:solidFill>
+          <a:noFill/>
           <a:ln w="38100">
             <a:solidFill>
               <a:schemeClr val="tx1"/>
@@ -5270,7 +5270,7 @@
         </p:nvSpPr>
         <p:spPr>
           <a:xfrm>
-            <a:off x="64294" y="81776"/>
+            <a:off x="64294" y="96064"/>
             <a:ext cx="6265069" cy="6675863"/>
           </a:xfrm>
           <a:prstGeom prst="rect">
@@ -5311,7 +5311,7 @@
     </p:spTree>
     <p:extLst>
       <p:ext uri="{BB962C8B-B14F-4D97-AF65-F5344CB8AC3E}">
-        <p14:creationId xmlns:p14="http://schemas.microsoft.com/office/powerpoint/2010/main" val="566991656"/>
+        <p14:creationId xmlns:p14="http://schemas.microsoft.com/office/powerpoint/2010/main" val="1723261790"/>
       </p:ext>
     </p:extLst>
   </p:cSld>
@@ -5627,12 +5627,7 @@
           <a:prstGeom prst="ellipse">
             <a:avLst/>
           </a:prstGeom>
-          <a:solidFill>
-            <a:schemeClr val="tx1">
-              <a:lumMod val="85000"/>
-              <a:lumOff val="15000"/>
-            </a:schemeClr>
-          </a:solidFill>
+          <a:noFill/>
           <a:ln w="38100">
             <a:solidFill>
               <a:schemeClr val="tx1"/>
@@ -5763,7 +5758,12 @@
           <a:prstGeom prst="ellipse">
             <a:avLst/>
           </a:prstGeom>
-          <a:noFill/>
+          <a:solidFill>
+            <a:schemeClr val="tx1">
+              <a:lumMod val="85000"/>
+              <a:lumOff val="15000"/>
+            </a:schemeClr>
+          </a:solidFill>
           <a:ln w="38100">
             <a:solidFill>
               <a:schemeClr val="tx1"/>
@@ -5861,7 +5861,7 @@
     </p:spTree>
     <p:extLst>
       <p:ext uri="{BB962C8B-B14F-4D97-AF65-F5344CB8AC3E}">
-        <p14:creationId xmlns:p14="http://schemas.microsoft.com/office/powerpoint/2010/main" val="424424708"/>
+        <p14:creationId xmlns:p14="http://schemas.microsoft.com/office/powerpoint/2010/main" val="566991656"/>
       </p:ext>
     </p:extLst>
   </p:cSld>

</xml_diff>